<commit_message>
Last changes before lab test
</commit_message>
<xml_diff>
--- a/images/image_creation.pptx
+++ b/images/image_creation.pptx
@@ -5,8 +5,10 @@
     <p:sldMasterId id="2147483648" r:id="rId1"/>
   </p:sldMasterIdLst>
   <p:sldIdLst>
-    <p:sldId id="256" r:id="rId2"/>
-    <p:sldId id="257" r:id="rId3"/>
+    <p:sldId id="258" r:id="rId2"/>
+    <p:sldId id="259" r:id="rId3"/>
+    <p:sldId id="256" r:id="rId4"/>
+    <p:sldId id="257" r:id="rId5"/>
   </p:sldIdLst>
   <p:sldSz cx="12192000" cy="6858000"/>
   <p:notesSz cx="6858000" cy="9144000"/>
@@ -116,7 +118,7 @@
 <file path=ppt/revisionInfo.xml><?xml version="1.0" encoding="utf-8"?>
 <p1510:revInfo xmlns:a="http://schemas.openxmlformats.org/drawingml/2006/main" xmlns:r="http://schemas.openxmlformats.org/officeDocument/2006/relationships" xmlns:p1510="http://schemas.microsoft.com/office/powerpoint/2015/10/main">
   <p1510:revLst>
-    <p1510:client id="{818F764C-B007-4291-9FD1-9F8D671BF984}" v="6" dt="2024-02-29T14:20:50.577"/>
+    <p1510:client id="{818F764C-B007-4291-9FD1-9F8D671BF984}" v="14" dt="2024-03-20T13:35:40.392"/>
   </p1510:revLst>
 </p1510:revInfo>
 </file>
@@ -125,8 +127,8 @@
 <pc:chgInfo xmlns:a="http://schemas.openxmlformats.org/drawingml/2006/main" xmlns:r="http://schemas.openxmlformats.org/officeDocument/2006/relationships" xmlns:ac="http://schemas.microsoft.com/office/drawing/2013/main/command" xmlns:pc="http://schemas.microsoft.com/office/powerpoint/2013/main/command">
   <pc:docChgLst>
     <pc:chgData name="Anna Liebelt" userId="a66c9eafe7ca5b97" providerId="LiveId" clId="{818F764C-B007-4291-9FD1-9F8D671BF984}"/>
-    <pc:docChg chg="undo redo custSel addSld delSld modSld">
-      <pc:chgData name="Anna Liebelt" userId="a66c9eafe7ca5b97" providerId="LiveId" clId="{818F764C-B007-4291-9FD1-9F8D671BF984}" dt="2024-02-29T16:22:11.607" v="64" actId="47"/>
+    <pc:docChg chg="undo redo custSel addSld delSld modSld sldOrd">
+      <pc:chgData name="Anna Liebelt" userId="a66c9eafe7ca5b97" providerId="LiveId" clId="{818F764C-B007-4291-9FD1-9F8D671BF984}" dt="2024-03-20T13:35:40.392" v="571"/>
       <pc:docMkLst>
         <pc:docMk/>
       </pc:docMkLst>
@@ -192,6 +194,68 @@
           </ac:picMkLst>
         </pc:picChg>
       </pc:sldChg>
+      <pc:sldChg chg="addSp delSp modSp new mod ord">
+        <pc:chgData name="Anna Liebelt" userId="a66c9eafe7ca5b97" providerId="LiveId" clId="{818F764C-B007-4291-9FD1-9F8D671BF984}" dt="2024-03-20T13:14:31.944" v="75" actId="21"/>
+        <pc:sldMkLst>
+          <pc:docMk/>
+          <pc:sldMk cId="3302061566" sldId="258"/>
+        </pc:sldMkLst>
+        <pc:spChg chg="add del mod">
+          <ac:chgData name="Anna Liebelt" userId="a66c9eafe7ca5b97" providerId="LiveId" clId="{818F764C-B007-4291-9FD1-9F8D671BF984}" dt="2024-03-20T13:14:31.944" v="75" actId="21"/>
+          <ac:spMkLst>
+            <pc:docMk/>
+            <pc:sldMk cId="3302061566" sldId="258"/>
+            <ac:spMk id="2" creationId="{432C7736-F5BB-6BA5-7E40-E771B3A53DC5}"/>
+          </ac:spMkLst>
+        </pc:spChg>
+        <pc:picChg chg="add mod ord">
+          <ac:chgData name="Anna Liebelt" userId="a66c9eafe7ca5b97" providerId="LiveId" clId="{818F764C-B007-4291-9FD1-9F8D671BF984}" dt="2024-03-20T13:14:29.627" v="74" actId="167"/>
+          <ac:picMkLst>
+            <pc:docMk/>
+            <pc:sldMk cId="3302061566" sldId="258"/>
+            <ac:picMk id="4" creationId="{715FBEFA-6C86-D070-5DD5-91ADEB91BAF3}"/>
+          </ac:picMkLst>
+        </pc:picChg>
+      </pc:sldChg>
+      <pc:sldChg chg="addSp delSp modSp new mod">
+        <pc:chgData name="Anna Liebelt" userId="a66c9eafe7ca5b97" providerId="LiveId" clId="{818F764C-B007-4291-9FD1-9F8D671BF984}" dt="2024-03-20T13:35:40.392" v="571"/>
+        <pc:sldMkLst>
+          <pc:docMk/>
+          <pc:sldMk cId="4284854527" sldId="259"/>
+        </pc:sldMkLst>
+        <pc:spChg chg="add mod">
+          <ac:chgData name="Anna Liebelt" userId="a66c9eafe7ca5b97" providerId="LiveId" clId="{818F764C-B007-4291-9FD1-9F8D671BF984}" dt="2024-03-20T13:20:33.901" v="569" actId="164"/>
+          <ac:spMkLst>
+            <pc:docMk/>
+            <pc:sldMk cId="4284854527" sldId="259"/>
+            <ac:spMk id="2" creationId="{432C7736-F5BB-6BA5-7E40-E771B3A53DC5}"/>
+          </ac:spMkLst>
+        </pc:spChg>
+        <pc:grpChg chg="add mod">
+          <ac:chgData name="Anna Liebelt" userId="a66c9eafe7ca5b97" providerId="LiveId" clId="{818F764C-B007-4291-9FD1-9F8D671BF984}" dt="2024-03-20T13:35:40.392" v="571"/>
+          <ac:grpSpMkLst>
+            <pc:docMk/>
+            <pc:sldMk cId="4284854527" sldId="259"/>
+            <ac:grpSpMk id="6" creationId="{67F9DB27-777B-3396-6E16-182C1A0C0568}"/>
+          </ac:grpSpMkLst>
+        </pc:grpChg>
+        <pc:picChg chg="add del mod">
+          <ac:chgData name="Anna Liebelt" userId="a66c9eafe7ca5b97" providerId="LiveId" clId="{818F764C-B007-4291-9FD1-9F8D671BF984}" dt="2024-03-20T13:15:27.169" v="82" actId="478"/>
+          <ac:picMkLst>
+            <pc:docMk/>
+            <pc:sldMk cId="4284854527" sldId="259"/>
+            <ac:picMk id="3" creationId="{9ECD6593-09A2-0A44-9A18-57383887D9EF}"/>
+          </ac:picMkLst>
+        </pc:picChg>
+        <pc:picChg chg="add mod">
+          <ac:chgData name="Anna Liebelt" userId="a66c9eafe7ca5b97" providerId="LiveId" clId="{818F764C-B007-4291-9FD1-9F8D671BF984}" dt="2024-03-20T13:20:33.901" v="569" actId="164"/>
+          <ac:picMkLst>
+            <pc:docMk/>
+            <pc:sldMk cId="4284854527" sldId="259"/>
+            <ac:picMk id="5" creationId="{B1658466-2118-9775-B31E-4D131820F066}"/>
+          </ac:picMkLst>
+        </pc:picChg>
+      </pc:sldChg>
     </pc:docChg>
   </pc:docChgLst>
 </pc:chgInfo>
@@ -346,7 +410,7 @@
           <a:p>
             <a:fld id="{C5084234-0BC5-4783-A72E-67C178EDE439}" type="datetimeFigureOut">
               <a:rPr lang="en-GB" smtClean="0"/>
-              <a:t>29/02/2024</a:t>
+              <a:t>20/03/2024</a:t>
             </a:fld>
             <a:endParaRPr lang="en-GB"/>
           </a:p>
@@ -546,7 +610,7 @@
           <a:p>
             <a:fld id="{C5084234-0BC5-4783-A72E-67C178EDE439}" type="datetimeFigureOut">
               <a:rPr lang="en-GB" smtClean="0"/>
-              <a:t>29/02/2024</a:t>
+              <a:t>20/03/2024</a:t>
             </a:fld>
             <a:endParaRPr lang="en-GB"/>
           </a:p>
@@ -756,7 +820,7 @@
           <a:p>
             <a:fld id="{C5084234-0BC5-4783-A72E-67C178EDE439}" type="datetimeFigureOut">
               <a:rPr lang="en-GB" smtClean="0"/>
-              <a:t>29/02/2024</a:t>
+              <a:t>20/03/2024</a:t>
             </a:fld>
             <a:endParaRPr lang="en-GB"/>
           </a:p>
@@ -956,7 +1020,7 @@
           <a:p>
             <a:fld id="{C5084234-0BC5-4783-A72E-67C178EDE439}" type="datetimeFigureOut">
               <a:rPr lang="en-GB" smtClean="0"/>
-              <a:t>29/02/2024</a:t>
+              <a:t>20/03/2024</a:t>
             </a:fld>
             <a:endParaRPr lang="en-GB"/>
           </a:p>
@@ -1232,7 +1296,7 @@
           <a:p>
             <a:fld id="{C5084234-0BC5-4783-A72E-67C178EDE439}" type="datetimeFigureOut">
               <a:rPr lang="en-GB" smtClean="0"/>
-              <a:t>29/02/2024</a:t>
+              <a:t>20/03/2024</a:t>
             </a:fld>
             <a:endParaRPr lang="en-GB"/>
           </a:p>
@@ -1500,7 +1564,7 @@
           <a:p>
             <a:fld id="{C5084234-0BC5-4783-A72E-67C178EDE439}" type="datetimeFigureOut">
               <a:rPr lang="en-GB" smtClean="0"/>
-              <a:t>29/02/2024</a:t>
+              <a:t>20/03/2024</a:t>
             </a:fld>
             <a:endParaRPr lang="en-GB"/>
           </a:p>
@@ -1915,7 +1979,7 @@
           <a:p>
             <a:fld id="{C5084234-0BC5-4783-A72E-67C178EDE439}" type="datetimeFigureOut">
               <a:rPr lang="en-GB" smtClean="0"/>
-              <a:t>29/02/2024</a:t>
+              <a:t>20/03/2024</a:t>
             </a:fld>
             <a:endParaRPr lang="en-GB"/>
           </a:p>
@@ -2057,7 +2121,7 @@
           <a:p>
             <a:fld id="{C5084234-0BC5-4783-A72E-67C178EDE439}" type="datetimeFigureOut">
               <a:rPr lang="en-GB" smtClean="0"/>
-              <a:t>29/02/2024</a:t>
+              <a:t>20/03/2024</a:t>
             </a:fld>
             <a:endParaRPr lang="en-GB"/>
           </a:p>
@@ -2170,7 +2234,7 @@
           <a:p>
             <a:fld id="{C5084234-0BC5-4783-A72E-67C178EDE439}" type="datetimeFigureOut">
               <a:rPr lang="en-GB" smtClean="0"/>
-              <a:t>29/02/2024</a:t>
+              <a:t>20/03/2024</a:t>
             </a:fld>
             <a:endParaRPr lang="en-GB"/>
           </a:p>
@@ -2483,7 +2547,7 @@
           <a:p>
             <a:fld id="{C5084234-0BC5-4783-A72E-67C178EDE439}" type="datetimeFigureOut">
               <a:rPr lang="en-GB" smtClean="0"/>
-              <a:t>29/02/2024</a:t>
+              <a:t>20/03/2024</a:t>
             </a:fld>
             <a:endParaRPr lang="en-GB"/>
           </a:p>
@@ -2772,7 +2836,7 @@
           <a:p>
             <a:fld id="{C5084234-0BC5-4783-A72E-67C178EDE439}" type="datetimeFigureOut">
               <a:rPr lang="en-GB" smtClean="0"/>
-              <a:t>29/02/2024</a:t>
+              <a:t>20/03/2024</a:t>
             </a:fld>
             <a:endParaRPr lang="en-GB"/>
           </a:p>
@@ -3015,7 +3079,7 @@
           <a:p>
             <a:fld id="{C5084234-0BC5-4783-A72E-67C178EDE439}" type="datetimeFigureOut">
               <a:rPr lang="en-GB" smtClean="0"/>
-              <a:t>29/02/2024</a:t>
+              <a:t>20/03/2024</a:t>
             </a:fld>
             <a:endParaRPr lang="en-GB"/>
           </a:p>
@@ -3432,6 +3496,300 @@
           <a:chExt cx="0" cy="0"/>
         </a:xfrm>
       </p:grpSpPr>
+      <p:pic>
+        <p:nvPicPr>
+          <p:cNvPr id="4" name="Picture 3" descr="A screenshot of a computer&#10;&#10;Description automatically generated">
+            <a:extLst>
+              <a:ext uri="{FF2B5EF4-FFF2-40B4-BE49-F238E27FC236}">
+                <a16:creationId xmlns:a16="http://schemas.microsoft.com/office/drawing/2014/main" id="{715FBEFA-6C86-D070-5DD5-91ADEB91BAF3}"/>
+              </a:ext>
+            </a:extLst>
+          </p:cNvPr>
+          <p:cNvPicPr>
+            <a:picLocks noChangeAspect="1"/>
+          </p:cNvPicPr>
+          <p:nvPr/>
+        </p:nvPicPr>
+        <p:blipFill>
+          <a:blip r:embed="rId2">
+            <a:extLst>
+              <a:ext uri="{28A0092B-C50C-407E-A947-70E740481C1C}">
+                <a14:useLocalDpi xmlns:a14="http://schemas.microsoft.com/office/drawing/2010/main" val="0"/>
+              </a:ext>
+            </a:extLst>
+          </a:blip>
+          <a:stretch>
+            <a:fillRect/>
+          </a:stretch>
+        </p:blipFill>
+        <p:spPr>
+          <a:xfrm>
+            <a:off x="0" y="0"/>
+            <a:ext cx="12192000" cy="6858000"/>
+          </a:xfrm>
+          <a:prstGeom prst="rect">
+            <a:avLst/>
+          </a:prstGeom>
+        </p:spPr>
+      </p:pic>
+    </p:spTree>
+    <p:extLst>
+      <p:ext uri="{BB962C8B-B14F-4D97-AF65-F5344CB8AC3E}">
+        <p14:creationId xmlns:p14="http://schemas.microsoft.com/office/powerpoint/2010/main" val="3302061566"/>
+      </p:ext>
+    </p:extLst>
+  </p:cSld>
+  <p:clrMapOvr>
+    <a:masterClrMapping/>
+  </p:clrMapOvr>
+</p:sld>
+</file>
+
+<file path=ppt/slides/slide2.xml><?xml version="1.0" encoding="utf-8"?>
+<p:sld xmlns:a="http://schemas.openxmlformats.org/drawingml/2006/main" xmlns:r="http://schemas.openxmlformats.org/officeDocument/2006/relationships" xmlns:p="http://schemas.openxmlformats.org/presentationml/2006/main">
+  <p:cSld>
+    <p:spTree>
+      <p:nvGrpSpPr>
+        <p:cNvPr id="1" name=""/>
+        <p:cNvGrpSpPr/>
+        <p:nvPr/>
+      </p:nvGrpSpPr>
+      <p:grpSpPr>
+        <a:xfrm>
+          <a:off x="0" y="0"/>
+          <a:ext cx="0" cy="0"/>
+          <a:chOff x="0" y="0"/>
+          <a:chExt cx="0" cy="0"/>
+        </a:xfrm>
+      </p:grpSpPr>
+      <p:grpSp>
+        <p:nvGrpSpPr>
+          <p:cNvPr id="6" name="Group 5">
+            <a:extLst>
+              <a:ext uri="{FF2B5EF4-FFF2-40B4-BE49-F238E27FC236}">
+                <a16:creationId xmlns:a16="http://schemas.microsoft.com/office/drawing/2014/main" id="{67F9DB27-777B-3396-6E16-182C1A0C0568}"/>
+              </a:ext>
+            </a:extLst>
+          </p:cNvPr>
+          <p:cNvGrpSpPr>
+            <a:grpSpLocks/>
+          </p:cNvGrpSpPr>
+          <p:nvPr/>
+        </p:nvGrpSpPr>
+        <p:grpSpPr>
+          <a:xfrm>
+            <a:off x="0" y="0"/>
+            <a:ext cx="12192000" cy="6858000"/>
+            <a:chOff x="0" y="0"/>
+            <a:chExt cx="12192000" cy="6858000"/>
+          </a:xfrm>
+        </p:grpSpPr>
+        <p:sp>
+          <p:nvSpPr>
+            <p:cNvPr id="2" name="Rectangle 1">
+              <a:extLst>
+                <a:ext uri="{FF2B5EF4-FFF2-40B4-BE49-F238E27FC236}">
+                  <a16:creationId xmlns:a16="http://schemas.microsoft.com/office/drawing/2014/main" id="{432C7736-F5BB-6BA5-7E40-E771B3A53DC5}"/>
+                </a:ext>
+              </a:extLst>
+            </p:cNvPr>
+            <p:cNvSpPr>
+              <a:spLocks noChangeAspect="1"/>
+            </p:cNvSpPr>
+            <p:nvPr/>
+          </p:nvSpPr>
+          <p:spPr>
+            <a:xfrm>
+              <a:off x="0" y="0"/>
+              <a:ext cx="12192000" cy="6858000"/>
+            </a:xfrm>
+            <a:prstGeom prst="rect">
+              <a:avLst/>
+            </a:prstGeom>
+            <a:solidFill>
+              <a:srgbClr val="808080"/>
+            </a:solidFill>
+          </p:spPr>
+          <p:style>
+            <a:lnRef idx="2">
+              <a:schemeClr val="accent1">
+                <a:shade val="15000"/>
+              </a:schemeClr>
+            </a:lnRef>
+            <a:fillRef idx="1">
+              <a:schemeClr val="accent1"/>
+            </a:fillRef>
+            <a:effectRef idx="0">
+              <a:schemeClr val="accent1"/>
+            </a:effectRef>
+            <a:fontRef idx="minor">
+              <a:schemeClr val="lt1"/>
+            </a:fontRef>
+          </p:style>
+          <p:txBody>
+            <a:bodyPr rtlCol="0" anchor="ctr"/>
+            <a:lstStyle/>
+            <a:p>
+              <a:pPr algn="ctr"/>
+              <a:r>
+                <a:rPr lang="en-GB" dirty="0">
+                  <a:solidFill>
+                    <a:schemeClr val="tx1"/>
+                  </a:solidFill>
+                  <a:latin typeface="Courier New" panose="02070309020205020404" pitchFamily="49" charset="0"/>
+                  <a:cs typeface="Courier New" panose="02070309020205020404" pitchFamily="49" charset="0"/>
+                </a:rPr>
+                <a:t>In this experiment, you’ll be given sentences to read. Please simply read these naturally and silently to yourself. Pay attention to the meaning of the sentences, as you’ll occasionally be asked questions about what you’re reading.</a:t>
+              </a:r>
+            </a:p>
+            <a:p>
+              <a:pPr algn="ctr"/>
+              <a:endParaRPr lang="en-GB" dirty="0">
+                <a:solidFill>
+                  <a:schemeClr val="tx1"/>
+                </a:solidFill>
+                <a:latin typeface="Courier New" panose="02070309020205020404" pitchFamily="49" charset="0"/>
+                <a:cs typeface="Courier New" panose="02070309020205020404" pitchFamily="49" charset="0"/>
+              </a:endParaRPr>
+            </a:p>
+            <a:p>
+              <a:pPr algn="ctr"/>
+              <a:r>
+                <a:rPr lang="en-GB" dirty="0">
+                  <a:solidFill>
+                    <a:schemeClr val="tx1"/>
+                  </a:solidFill>
+                  <a:latin typeface="Courier New" panose="02070309020205020404" pitchFamily="49" charset="0"/>
+                  <a:cs typeface="Courier New" panose="02070309020205020404" pitchFamily="49" charset="0"/>
+                </a:rPr>
+                <a:t>At the beginning of each sentence, you’ll be asked to look at the following dot:</a:t>
+              </a:r>
+            </a:p>
+            <a:p>
+              <a:pPr algn="ctr"/>
+              <a:endParaRPr lang="en-GB" dirty="0">
+                <a:solidFill>
+                  <a:schemeClr val="tx1"/>
+                </a:solidFill>
+                <a:latin typeface="Courier New" panose="02070309020205020404" pitchFamily="49" charset="0"/>
+                <a:cs typeface="Courier New" panose="02070309020205020404" pitchFamily="49" charset="0"/>
+              </a:endParaRPr>
+            </a:p>
+            <a:p>
+              <a:pPr algn="ctr"/>
+              <a:endParaRPr lang="en-GB" dirty="0">
+                <a:solidFill>
+                  <a:schemeClr val="tx1"/>
+                </a:solidFill>
+                <a:latin typeface="Courier New" panose="02070309020205020404" pitchFamily="49" charset="0"/>
+                <a:cs typeface="Courier New" panose="02070309020205020404" pitchFamily="49" charset="0"/>
+              </a:endParaRPr>
+            </a:p>
+            <a:p>
+              <a:pPr algn="ctr"/>
+              <a:r>
+                <a:rPr lang="en-GB" dirty="0">
+                  <a:solidFill>
+                    <a:schemeClr val="tx1"/>
+                  </a:solidFill>
+                  <a:latin typeface="Courier New" panose="02070309020205020404" pitchFamily="49" charset="0"/>
+                  <a:cs typeface="Courier New" panose="02070309020205020404" pitchFamily="49" charset="0"/>
+                </a:rPr>
+                <a:t>You’ll then be shown the sentences to read.</a:t>
+              </a:r>
+            </a:p>
+            <a:p>
+              <a:pPr algn="ctr"/>
+              <a:endParaRPr lang="en-GB" dirty="0">
+                <a:solidFill>
+                  <a:schemeClr val="tx1"/>
+                </a:solidFill>
+                <a:latin typeface="Courier New" panose="02070309020205020404" pitchFamily="49" charset="0"/>
+                <a:cs typeface="Courier New" panose="02070309020205020404" pitchFamily="49" charset="0"/>
+              </a:endParaRPr>
+            </a:p>
+            <a:p>
+              <a:pPr algn="ctr"/>
+              <a:r>
+                <a:rPr lang="en-GB" dirty="0">
+                  <a:solidFill>
+                    <a:schemeClr val="tx1"/>
+                  </a:solidFill>
+                  <a:latin typeface="Courier New" panose="02070309020205020404" pitchFamily="49" charset="0"/>
+                  <a:cs typeface="Courier New" panose="02070309020205020404" pitchFamily="49" charset="0"/>
+                </a:rPr>
+                <a:t>Please press the spacebar to proceed to the eye calibration process.</a:t>
+              </a:r>
+            </a:p>
+          </p:txBody>
+        </p:sp>
+        <p:pic>
+          <p:nvPicPr>
+            <p:cNvPr id="5" name="Picture 4">
+              <a:extLst>
+                <a:ext uri="{FF2B5EF4-FFF2-40B4-BE49-F238E27FC236}">
+                  <a16:creationId xmlns:a16="http://schemas.microsoft.com/office/drawing/2014/main" id="{B1658466-2118-9775-B31E-4D131820F066}"/>
+                </a:ext>
+              </a:extLst>
+            </p:cNvPr>
+            <p:cNvPicPr>
+              <a:picLocks noChangeAspect="1"/>
+            </p:cNvPicPr>
+            <p:nvPr/>
+          </p:nvPicPr>
+          <p:blipFill>
+            <a:blip r:embed="rId2">
+              <a:extLst>
+                <a:ext uri="{28A0092B-C50C-407E-A947-70E740481C1C}">
+                  <a14:useLocalDpi xmlns:a14="http://schemas.microsoft.com/office/drawing/2010/main" val="0"/>
+                </a:ext>
+              </a:extLst>
+            </a:blip>
+            <a:stretch>
+              <a:fillRect/>
+            </a:stretch>
+          </p:blipFill>
+          <p:spPr>
+            <a:xfrm>
+              <a:off x="5968993" y="3556000"/>
+              <a:ext cx="254013" cy="292115"/>
+            </a:xfrm>
+            <a:prstGeom prst="rect">
+              <a:avLst/>
+            </a:prstGeom>
+          </p:spPr>
+        </p:pic>
+      </p:grpSp>
+    </p:spTree>
+    <p:extLst>
+      <p:ext uri="{BB962C8B-B14F-4D97-AF65-F5344CB8AC3E}">
+        <p14:creationId xmlns:p14="http://schemas.microsoft.com/office/powerpoint/2010/main" val="4284854527"/>
+      </p:ext>
+    </p:extLst>
+  </p:cSld>
+  <p:clrMapOvr>
+    <a:masterClrMapping/>
+  </p:clrMapOvr>
+</p:sld>
+</file>
+
+<file path=ppt/slides/slide3.xml><?xml version="1.0" encoding="utf-8"?>
+<p:sld xmlns:a="http://schemas.openxmlformats.org/drawingml/2006/main" xmlns:r="http://schemas.openxmlformats.org/officeDocument/2006/relationships" xmlns:p="http://schemas.openxmlformats.org/presentationml/2006/main">
+  <p:cSld>
+    <p:spTree>
+      <p:nvGrpSpPr>
+        <p:cNvPr id="1" name=""/>
+        <p:cNvGrpSpPr/>
+        <p:nvPr/>
+      </p:nvGrpSpPr>
+      <p:grpSpPr>
+        <a:xfrm>
+          <a:off x="0" y="0"/>
+          <a:ext cx="0" cy="0"/>
+          <a:chOff x="0" y="0"/>
+          <a:chExt cx="0" cy="0"/>
+        </a:xfrm>
+      </p:grpSpPr>
       <p:sp>
         <p:nvSpPr>
           <p:cNvPr id="4" name="TextBox 3">
@@ -3491,7 +3849,7 @@
 </p:sld>
 </file>
 
-<file path=ppt/slides/slide2.xml><?xml version="1.0" encoding="utf-8"?>
+<file path=ppt/slides/slide4.xml><?xml version="1.0" encoding="utf-8"?>
 <p:sld xmlns:a="http://schemas.openxmlformats.org/drawingml/2006/main" xmlns:r="http://schemas.openxmlformats.org/officeDocument/2006/relationships" xmlns:p="http://schemas.openxmlformats.org/presentationml/2006/main">
   <p:cSld>
     <p:spTree>

</xml_diff>